<commit_message>
FInished graduating student stakeholder findings.
</commit_message>
<xml_diff>
--- a/images/research-questions.pptx
+++ b/images/research-questions.pptx
@@ -197,7 +197,7 @@
           <a:p>
             <a:fld id="{100ED05C-71D3-764E-A828-6A477128AC85}" type="datetimeFigureOut">
               <a:rPr lang="en-US" smtClean="0"/>
-              <a:t>6/28/22</a:t>
+              <a:t>7/13/22</a:t>
             </a:fld>
             <a:endParaRPr lang="en-US"/>
           </a:p>
@@ -611,7 +611,7 @@
           <a:p>
             <a:fld id="{AC2DA135-C281-A445-BCE4-7A84076579A3}" type="datetimeFigureOut">
               <a:rPr lang="en-US" smtClean="0"/>
-              <a:t>6/28/22</a:t>
+              <a:t>7/13/22</a:t>
             </a:fld>
             <a:endParaRPr lang="en-US"/>
           </a:p>
@@ -809,7 +809,7 @@
           <a:p>
             <a:fld id="{AC2DA135-C281-A445-BCE4-7A84076579A3}" type="datetimeFigureOut">
               <a:rPr lang="en-US" smtClean="0"/>
-              <a:t>6/28/22</a:t>
+              <a:t>7/13/22</a:t>
             </a:fld>
             <a:endParaRPr lang="en-US"/>
           </a:p>
@@ -1017,7 +1017,7 @@
           <a:p>
             <a:fld id="{AC2DA135-C281-A445-BCE4-7A84076579A3}" type="datetimeFigureOut">
               <a:rPr lang="en-US" smtClean="0"/>
-              <a:t>6/28/22</a:t>
+              <a:t>7/13/22</a:t>
             </a:fld>
             <a:endParaRPr lang="en-US"/>
           </a:p>
@@ -1215,7 +1215,7 @@
           <a:p>
             <a:fld id="{AC2DA135-C281-A445-BCE4-7A84076579A3}" type="datetimeFigureOut">
               <a:rPr lang="en-US" smtClean="0"/>
-              <a:t>6/28/22</a:t>
+              <a:t>7/13/22</a:t>
             </a:fld>
             <a:endParaRPr lang="en-US"/>
           </a:p>
@@ -1490,7 +1490,7 @@
           <a:p>
             <a:fld id="{AC2DA135-C281-A445-BCE4-7A84076579A3}" type="datetimeFigureOut">
               <a:rPr lang="en-US" smtClean="0"/>
-              <a:t>6/28/22</a:t>
+              <a:t>7/13/22</a:t>
             </a:fld>
             <a:endParaRPr lang="en-US"/>
           </a:p>
@@ -1755,7 +1755,7 @@
           <a:p>
             <a:fld id="{AC2DA135-C281-A445-BCE4-7A84076579A3}" type="datetimeFigureOut">
               <a:rPr lang="en-US" smtClean="0"/>
-              <a:t>6/28/22</a:t>
+              <a:t>7/13/22</a:t>
             </a:fld>
             <a:endParaRPr lang="en-US"/>
           </a:p>
@@ -2167,7 +2167,7 @@
           <a:p>
             <a:fld id="{AC2DA135-C281-A445-BCE4-7A84076579A3}" type="datetimeFigureOut">
               <a:rPr lang="en-US" smtClean="0"/>
-              <a:t>6/28/22</a:t>
+              <a:t>7/13/22</a:t>
             </a:fld>
             <a:endParaRPr lang="en-US"/>
           </a:p>
@@ -2308,7 +2308,7 @@
           <a:p>
             <a:fld id="{AC2DA135-C281-A445-BCE4-7A84076579A3}" type="datetimeFigureOut">
               <a:rPr lang="en-US" smtClean="0"/>
-              <a:t>6/28/22</a:t>
+              <a:t>7/13/22</a:t>
             </a:fld>
             <a:endParaRPr lang="en-US"/>
           </a:p>
@@ -2421,7 +2421,7 @@
           <a:p>
             <a:fld id="{AC2DA135-C281-A445-BCE4-7A84076579A3}" type="datetimeFigureOut">
               <a:rPr lang="en-US" smtClean="0"/>
-              <a:t>6/28/22</a:t>
+              <a:t>7/13/22</a:t>
             </a:fld>
             <a:endParaRPr lang="en-US"/>
           </a:p>
@@ -2732,7 +2732,7 @@
           <a:p>
             <a:fld id="{AC2DA135-C281-A445-BCE4-7A84076579A3}" type="datetimeFigureOut">
               <a:rPr lang="en-US" smtClean="0"/>
-              <a:t>6/28/22</a:t>
+              <a:t>7/13/22</a:t>
             </a:fld>
             <a:endParaRPr lang="en-US"/>
           </a:p>
@@ -3020,7 +3020,7 @@
           <a:p>
             <a:fld id="{AC2DA135-C281-A445-BCE4-7A84076579A3}" type="datetimeFigureOut">
               <a:rPr lang="en-US" smtClean="0"/>
-              <a:t>6/28/22</a:t>
+              <a:t>7/13/22</a:t>
             </a:fld>
             <a:endParaRPr lang="en-US"/>
           </a:p>
@@ -3261,7 +3261,7 @@
           <a:p>
             <a:fld id="{AC2DA135-C281-A445-BCE4-7A84076579A3}" type="datetimeFigureOut">
               <a:rPr lang="en-US" smtClean="0"/>
-              <a:t>6/28/22</a:t>
+              <a:t>7/13/22</a:t>
             </a:fld>
             <a:endParaRPr lang="en-US"/>
           </a:p>
@@ -4089,8 +4089,8 @@
         </p:nvSpPr>
         <p:spPr>
           <a:xfrm>
-            <a:off x="2575462" y="3414697"/>
-            <a:ext cx="2945422" cy="646331"/>
+            <a:off x="2712092" y="3414697"/>
+            <a:ext cx="2752869" cy="646331"/>
           </a:xfrm>
           <a:prstGeom prst="rect">
             <a:avLst/>
@@ -4112,15 +4112,7 @@
             </a:br>
             <a:r>
               <a:rPr lang="en-US" dirty="0"/>
-              <a:t>under-</a:t>
-            </a:r>
-            <a:r>
-              <a:rPr lang="en-US" dirty="0" err="1"/>
-              <a:t>rerepresented</a:t>
-            </a:r>
-            <a:r>
-              <a:rPr lang="en-US" dirty="0"/>
-              <a:t> groups?</a:t>
+              <a:t>under-represented groups?</a:t>
             </a:r>
           </a:p>
         </p:txBody>
@@ -4139,7 +4131,7 @@
         </p:nvSpPr>
         <p:spPr>
           <a:xfrm>
-            <a:off x="2866213" y="4160203"/>
+            <a:off x="2897743" y="4160203"/>
             <a:ext cx="2556854" cy="646331"/>
           </a:xfrm>
           <a:prstGeom prst="rect">
@@ -4180,8 +4172,8 @@
         </p:nvSpPr>
         <p:spPr>
           <a:xfrm>
-            <a:off x="3135334" y="4916141"/>
-            <a:ext cx="2293320" cy="646331"/>
+            <a:off x="2557267" y="4916141"/>
+            <a:ext cx="2818720" cy="646331"/>
           </a:xfrm>
           <a:prstGeom prst="rect">
             <a:avLst/>
@@ -4196,13 +4188,13 @@
           <a:p>
             <a:r>
               <a:rPr lang="en-US" dirty="0"/>
-              <a:t>Helpful to broadening </a:t>
+              <a:t>Helpful for broadening </a:t>
             </a:r>
           </a:p>
           <a:p>
             <a:r>
               <a:rPr lang="en-US" dirty="0"/>
-              <a:t>my perspective on CS?</a:t>
+              <a:t>student perspectives on CS?</a:t>
             </a:r>
           </a:p>
         </p:txBody>
@@ -4887,6 +4879,150 @@
         <p:spPr>
           <a:xfrm>
             <a:off x="6106043" y="6112561"/>
+            <a:ext cx="369332" cy="369332"/>
+          </a:xfrm>
+          <a:prstGeom prst="rect">
+            <a:avLst/>
+          </a:prstGeom>
+        </p:spPr>
+      </p:pic>
+      <p:pic>
+        <p:nvPicPr>
+          <p:cNvPr id="2" name="Graphic 1" descr="Checkmark with solid fill">
+            <a:extLst>
+              <a:ext uri="{FF2B5EF4-FFF2-40B4-BE49-F238E27FC236}">
+                <a16:creationId xmlns:a16="http://schemas.microsoft.com/office/drawing/2014/main" id="{6CF39263-C073-41F4-2090-0B8FC98C3397}"/>
+              </a:ext>
+            </a:extLst>
+          </p:cNvPr>
+          <p:cNvPicPr>
+            <a:picLocks noChangeAspect="1"/>
+          </p:cNvPicPr>
+          <p:nvPr/>
+        </p:nvPicPr>
+        <p:blipFill>
+          <a:blip r:embed="rId2">
+            <a:extLst>
+              <a:ext uri="{96DAC541-7B7A-43D3-8B79-37D633B846F1}">
+                <asvg:svgBlip xmlns:asvg="http://schemas.microsoft.com/office/drawing/2016/SVG/main" r:embed="rId3"/>
+              </a:ext>
+            </a:extLst>
+          </a:blip>
+          <a:stretch>
+            <a:fillRect/>
+          </a:stretch>
+        </p:blipFill>
+        <p:spPr>
+          <a:xfrm>
+            <a:off x="8332781" y="5533580"/>
+            <a:ext cx="369332" cy="369332"/>
+          </a:xfrm>
+          <a:prstGeom prst="rect">
+            <a:avLst/>
+          </a:prstGeom>
+        </p:spPr>
+      </p:pic>
+      <p:pic>
+        <p:nvPicPr>
+          <p:cNvPr id="17" name="Graphic 16" descr="Checkmark with solid fill">
+            <a:extLst>
+              <a:ext uri="{FF2B5EF4-FFF2-40B4-BE49-F238E27FC236}">
+                <a16:creationId xmlns:a16="http://schemas.microsoft.com/office/drawing/2014/main" id="{356C4066-7A61-19D1-799A-934BC363DF0C}"/>
+              </a:ext>
+            </a:extLst>
+          </p:cNvPr>
+          <p:cNvPicPr>
+            <a:picLocks noChangeAspect="1"/>
+          </p:cNvPicPr>
+          <p:nvPr/>
+        </p:nvPicPr>
+        <p:blipFill>
+          <a:blip r:embed="rId2">
+            <a:extLst>
+              <a:ext uri="{96DAC541-7B7A-43D3-8B79-37D633B846F1}">
+                <asvg:svgBlip xmlns:asvg="http://schemas.microsoft.com/office/drawing/2016/SVG/main" r:embed="rId3"/>
+              </a:ext>
+            </a:extLst>
+          </a:blip>
+          <a:stretch>
+            <a:fillRect/>
+          </a:stretch>
+        </p:blipFill>
+        <p:spPr>
+          <a:xfrm>
+            <a:off x="8332781" y="6041411"/>
+            <a:ext cx="369332" cy="369332"/>
+          </a:xfrm>
+          <a:prstGeom prst="rect">
+            <a:avLst/>
+          </a:prstGeom>
+        </p:spPr>
+      </p:pic>
+      <p:pic>
+        <p:nvPicPr>
+          <p:cNvPr id="37" name="Graphic 36" descr="Checkmark with solid fill">
+            <a:extLst>
+              <a:ext uri="{FF2B5EF4-FFF2-40B4-BE49-F238E27FC236}">
+                <a16:creationId xmlns:a16="http://schemas.microsoft.com/office/drawing/2014/main" id="{9B957DC2-4FB7-B0B5-C132-02924C4C8A6C}"/>
+              </a:ext>
+            </a:extLst>
+          </p:cNvPr>
+          <p:cNvPicPr>
+            <a:picLocks noChangeAspect="1"/>
+          </p:cNvPicPr>
+          <p:nvPr/>
+        </p:nvPicPr>
+        <p:blipFill>
+          <a:blip r:embed="rId2">
+            <a:extLst>
+              <a:ext uri="{96DAC541-7B7A-43D3-8B79-37D633B846F1}">
+                <asvg:svgBlip xmlns:asvg="http://schemas.microsoft.com/office/drawing/2016/SVG/main" r:embed="rId3"/>
+              </a:ext>
+            </a:extLst>
+          </a:blip>
+          <a:stretch>
+            <a:fillRect/>
+          </a:stretch>
+        </p:blipFill>
+        <p:spPr>
+          <a:xfrm>
+            <a:off x="6160724" y="1239916"/>
+            <a:ext cx="369332" cy="369332"/>
+          </a:xfrm>
+          <a:prstGeom prst="rect">
+            <a:avLst/>
+          </a:prstGeom>
+        </p:spPr>
+      </p:pic>
+      <p:pic>
+        <p:nvPicPr>
+          <p:cNvPr id="38" name="Graphic 37" descr="Checkmark with solid fill">
+            <a:extLst>
+              <a:ext uri="{FF2B5EF4-FFF2-40B4-BE49-F238E27FC236}">
+                <a16:creationId xmlns:a16="http://schemas.microsoft.com/office/drawing/2014/main" id="{0F400BE5-2F25-21DB-8E14-24F5040175E3}"/>
+              </a:ext>
+            </a:extLst>
+          </p:cNvPr>
+          <p:cNvPicPr>
+            <a:picLocks noChangeAspect="1"/>
+          </p:cNvPicPr>
+          <p:nvPr/>
+        </p:nvPicPr>
+        <p:blipFill>
+          <a:blip r:embed="rId2">
+            <a:extLst>
+              <a:ext uri="{96DAC541-7B7A-43D3-8B79-37D633B846F1}">
+                <asvg:svgBlip xmlns:asvg="http://schemas.microsoft.com/office/drawing/2016/SVG/main" r:embed="rId3"/>
+              </a:ext>
+            </a:extLst>
+          </a:blip>
+          <a:stretch>
+            <a:fillRect/>
+          </a:stretch>
+        </p:blipFill>
+        <p:spPr>
+          <a:xfrm>
+            <a:off x="8332781" y="894122"/>
             <a:ext cx="369332" cy="369332"/>
           </a:xfrm>
           <a:prstGeom prst="rect">

</xml_diff>